<commit_message>
Fixed radix and merge sort
</commit_message>
<xml_diff>
--- a/Python sort visualizer.pptx
+++ b/Python sort visualizer.pptx
@@ -15,7 +15,8 @@
     <p:sldId id="261" r:id="rId9"/>
     <p:sldId id="264" r:id="rId10"/>
     <p:sldId id="265" r:id="rId11"/>
-    <p:sldId id="266" r:id="rId12"/>
+    <p:sldId id="267" r:id="rId12"/>
+    <p:sldId id="266" r:id="rId13"/>
   </p:sldIdLst>
   <p:sldSz cx="12192000" cy="6858000"/>
   <p:notesSz cx="6858000" cy="9144000"/>
@@ -114,6 +115,11 @@
       </a:defRPr>
     </a:lvl9pPr>
   </p:defaultTextStyle>
+  <p:extLst>
+    <p:ext uri="{EFAFB233-063F-42B5-8137-9DF3F51BA10A}">
+      <p15:sldGuideLst xmlns:p15="http://schemas.microsoft.com/office/powerpoint/2012/main"/>
+    </p:ext>
+  </p:extLst>
 </p:presentation>
 </file>
 
@@ -280,7 +286,7 @@
           <a:p>
             <a:fld id="{D9E18FF6-B8FF-447C-895D-B33C6971A63A}" type="datetimeFigureOut">
               <a:rPr lang="hr-HR" smtClean="0"/>
-              <a:t>23.11.2020.</a:t>
+              <a:t>30.11.2020.</a:t>
             </a:fld>
             <a:endParaRPr lang="hr-HR"/>
           </a:p>
@@ -450,7 +456,7 @@
           <a:p>
             <a:fld id="{D9E18FF6-B8FF-447C-895D-B33C6971A63A}" type="datetimeFigureOut">
               <a:rPr lang="hr-HR" smtClean="0"/>
-              <a:t>23.11.2020.</a:t>
+              <a:t>30.11.2020.</a:t>
             </a:fld>
             <a:endParaRPr lang="hr-HR"/>
           </a:p>
@@ -630,7 +636,7 @@
           <a:p>
             <a:fld id="{D9E18FF6-B8FF-447C-895D-B33C6971A63A}" type="datetimeFigureOut">
               <a:rPr lang="hr-HR" smtClean="0"/>
-              <a:t>23.11.2020.</a:t>
+              <a:t>30.11.2020.</a:t>
             </a:fld>
             <a:endParaRPr lang="hr-HR"/>
           </a:p>
@@ -800,7 +806,7 @@
           <a:p>
             <a:fld id="{D9E18FF6-B8FF-447C-895D-B33C6971A63A}" type="datetimeFigureOut">
               <a:rPr lang="hr-HR" smtClean="0"/>
-              <a:t>23.11.2020.</a:t>
+              <a:t>30.11.2020.</a:t>
             </a:fld>
             <a:endParaRPr lang="hr-HR"/>
           </a:p>
@@ -1068,7 +1074,7 @@
           <a:p>
             <a:fld id="{D9E18FF6-B8FF-447C-895D-B33C6971A63A}" type="datetimeFigureOut">
               <a:rPr lang="hr-HR" smtClean="0"/>
-              <a:t>23.11.2020.</a:t>
+              <a:t>30.11.2020.</a:t>
             </a:fld>
             <a:endParaRPr lang="hr-HR"/>
           </a:p>
@@ -1300,7 +1306,7 @@
           <a:p>
             <a:fld id="{D9E18FF6-B8FF-447C-895D-B33C6971A63A}" type="datetimeFigureOut">
               <a:rPr lang="hr-HR" smtClean="0"/>
-              <a:t>23.11.2020.</a:t>
+              <a:t>30.11.2020.</a:t>
             </a:fld>
             <a:endParaRPr lang="hr-HR"/>
           </a:p>
@@ -1659,7 +1665,7 @@
           <a:p>
             <a:fld id="{D9E18FF6-B8FF-447C-895D-B33C6971A63A}" type="datetimeFigureOut">
               <a:rPr lang="hr-HR" smtClean="0"/>
-              <a:t>23.11.2020.</a:t>
+              <a:t>30.11.2020.</a:t>
             </a:fld>
             <a:endParaRPr lang="hr-HR"/>
           </a:p>
@@ -1800,7 +1806,7 @@
           <a:p>
             <a:fld id="{D9E18FF6-B8FF-447C-895D-B33C6971A63A}" type="datetimeFigureOut">
               <a:rPr lang="hr-HR" smtClean="0"/>
-              <a:t>23.11.2020.</a:t>
+              <a:t>30.11.2020.</a:t>
             </a:fld>
             <a:endParaRPr lang="hr-HR"/>
           </a:p>
@@ -1895,7 +1901,7 @@
           <a:p>
             <a:fld id="{D9E18FF6-B8FF-447C-895D-B33C6971A63A}" type="datetimeFigureOut">
               <a:rPr lang="hr-HR" smtClean="0"/>
-              <a:t>23.11.2020.</a:t>
+              <a:t>30.11.2020.</a:t>
             </a:fld>
             <a:endParaRPr lang="hr-HR"/>
           </a:p>
@@ -2252,7 +2258,7 @@
           <a:p>
             <a:fld id="{D9E18FF6-B8FF-447C-895D-B33C6971A63A}" type="datetimeFigureOut">
               <a:rPr lang="hr-HR" smtClean="0"/>
-              <a:t>23.11.2020.</a:t>
+              <a:t>30.11.2020.</a:t>
             </a:fld>
             <a:endParaRPr lang="hr-HR"/>
           </a:p>
@@ -2609,7 +2615,7 @@
           <a:p>
             <a:fld id="{D9E18FF6-B8FF-447C-895D-B33C6971A63A}" type="datetimeFigureOut">
               <a:rPr lang="hr-HR" smtClean="0"/>
-              <a:t>23.11.2020.</a:t>
+              <a:t>30.11.2020.</a:t>
             </a:fld>
             <a:endParaRPr lang="hr-HR"/>
           </a:p>
@@ -2851,7 +2857,7 @@
           <a:p>
             <a:fld id="{D9E18FF6-B8FF-447C-895D-B33C6971A63A}" type="datetimeFigureOut">
               <a:rPr lang="hr-HR" smtClean="0"/>
-              <a:t>23.11.2020.</a:t>
+              <a:t>30.11.2020.</a:t>
             </a:fld>
             <a:endParaRPr lang="hr-HR"/>
           </a:p>
@@ -3424,7 +3430,7 @@
           <a:graphicData uri="http://schemas.openxmlformats.org/presentationml/2006/ole">
             <mc:AlternateContent xmlns:mc="http://schemas.openxmlformats.org/markup-compatibility/2006">
               <mc:Choice xmlns:v="urn:schemas-microsoft-com:vml" Requires="v">
-                <p:oleObj spid="_x0000_s5126" name="Document" r:id="rId3" imgW="8124840" imgH="5523840" progId="Word.OpenDocumentText.12">
+                <p:oleObj spid="_x0000_s5132" name="Document" r:id="rId3" imgW="8124840" imgH="5523840" progId="Word.OpenDocumentText.12">
                   <p:embed/>
                 </p:oleObj>
               </mc:Choice>
@@ -3487,7 +3493,7 @@
           <a:graphicData uri="http://schemas.openxmlformats.org/presentationml/2006/ole">
             <mc:AlternateContent xmlns:mc="http://schemas.openxmlformats.org/markup-compatibility/2006">
               <mc:Choice xmlns:v="urn:schemas-microsoft-com:vml" Requires="v">
-                <p:oleObj spid="_x0000_s5127" name="Document" r:id="rId5" imgW="8124840" imgH="5418000" progId="Word.OpenDocumentText.12">
+                <p:oleObj spid="_x0000_s5133" name="Document" r:id="rId5" imgW="8124840" imgH="5418000" progId="Word.OpenDocumentText.12">
                   <p:embed/>
                 </p:oleObj>
               </mc:Choice>
@@ -3550,7 +3556,7 @@
           <a:graphicData uri="http://schemas.openxmlformats.org/presentationml/2006/ole">
             <mc:AlternateContent xmlns:mc="http://schemas.openxmlformats.org/markup-compatibility/2006">
               <mc:Choice xmlns:v="urn:schemas-microsoft-com:vml" Requires="v">
-                <p:oleObj spid="_x0000_s5128" name="Document" r:id="rId7" imgW="8124840" imgH="5418000" progId="Word.OpenDocumentText.12">
+                <p:oleObj spid="_x0000_s5134" name="Document" r:id="rId7" imgW="8124840" imgH="5418000" progId="Word.OpenDocumentText.12">
                   <p:embed/>
                 </p:oleObj>
               </mc:Choice>
@@ -4015,7 +4021,7 @@
           <a:p>
             <a:r>
               <a:rPr lang="hr-HR" dirty="0"/>
-              <a:t>ona sadrži naziv algoritma, polje koje se sortira, okvir u kojemu se nalazi i callback funkciju koja se izvršava kada sortiranje završi</a:t>
+              <a:t>ona sadrži naziv algoritma, polje koje se sortira i okvir u kojemu se nalazi</a:t>
             </a:r>
           </a:p>
           <a:p>
@@ -4040,6 +4046,128 @@
 </file>
 
 <file path=ppt/slides/slide11.xml><?xml version="1.0" encoding="utf-8"?>
+<p:sld xmlns:a="http://schemas.openxmlformats.org/drawingml/2006/main" xmlns:r="http://schemas.openxmlformats.org/officeDocument/2006/relationships" xmlns:p="http://schemas.openxmlformats.org/presentationml/2006/main">
+  <p:cSld>
+    <p:spTree>
+      <p:nvGrpSpPr>
+        <p:cNvPr id="1" name=""/>
+        <p:cNvGrpSpPr/>
+        <p:nvPr/>
+      </p:nvGrpSpPr>
+      <p:grpSpPr>
+        <a:xfrm>
+          <a:off x="0" y="0"/>
+          <a:ext cx="0" cy="0"/>
+          <a:chOff x="0" y="0"/>
+          <a:chExt cx="0" cy="0"/>
+        </a:xfrm>
+      </p:grpSpPr>
+      <p:sp>
+        <p:nvSpPr>
+          <p:cNvPr id="2" name="Title 1">
+            <a:extLst>
+              <a:ext uri="{FF2B5EF4-FFF2-40B4-BE49-F238E27FC236}">
+                <a16:creationId xmlns:a16="http://schemas.microsoft.com/office/drawing/2014/main" id="{6669A798-0439-4CBD-AFF5-4E914C457F52}"/>
+              </a:ext>
+            </a:extLst>
+          </p:cNvPr>
+          <p:cNvSpPr>
+            <a:spLocks noGrp="1"/>
+          </p:cNvSpPr>
+          <p:nvPr>
+            <p:ph type="title"/>
+          </p:nvPr>
+        </p:nvSpPr>
+        <p:spPr/>
+        <p:txBody>
+          <a:bodyPr/>
+          <a:lstStyle/>
+          <a:p>
+            <a:r>
+              <a:rPr lang="hr-HR" dirty="0"/>
+              <a:t>PRIMJER SORT IMPLEMENTACIJE</a:t>
+            </a:r>
+          </a:p>
+        </p:txBody>
+      </p:sp>
+      <p:graphicFrame>
+        <p:nvGraphicFramePr>
+          <p:cNvPr id="4" name="Content Placeholder 3">
+            <a:extLst>
+              <a:ext uri="{FF2B5EF4-FFF2-40B4-BE49-F238E27FC236}">
+                <a16:creationId xmlns:a16="http://schemas.microsoft.com/office/drawing/2014/main" id="{708E22E4-AABB-4E6D-BA38-AD1FEF7474FE}"/>
+              </a:ext>
+            </a:extLst>
+          </p:cNvPr>
+          <p:cNvGraphicFramePr>
+            <a:graphicFrameLocks noGrp="1" noChangeAspect="1"/>
+          </p:cNvGraphicFramePr>
+          <p:nvPr>
+            <p:ph idx="1"/>
+            <p:extLst>
+              <p:ext uri="{D42A27DB-BD31-4B8C-83A1-F6EECF244321}">
+                <p14:modId xmlns:p14="http://schemas.microsoft.com/office/powerpoint/2010/main" val="2937714933"/>
+              </p:ext>
+            </p:extLst>
+          </p:nvPr>
+        </p:nvGraphicFramePr>
+        <p:xfrm>
+          <a:off x="3773488" y="2638425"/>
+          <a:ext cx="4638675" cy="3735388"/>
+        </p:xfrm>
+        <a:graphic>
+          <a:graphicData uri="http://schemas.openxmlformats.org/presentationml/2006/ole">
+            <mc:AlternateContent xmlns:mc="http://schemas.openxmlformats.org/markup-compatibility/2006">
+              <mc:Choice xmlns:v="urn:schemas-microsoft-com:vml" Requires="v">
+                <p:oleObj spid="_x0000_s6147" name="Document" r:id="rId3" imgW="8124840" imgH="6543000" progId="Word.OpenDocumentText.12">
+                  <p:embed/>
+                </p:oleObj>
+              </mc:Choice>
+              <mc:Fallback>
+                <p:oleObj name="Document" r:id="rId3" imgW="8124840" imgH="6543000" progId="Word.OpenDocumentText.12">
+                  <p:embed/>
+                  <p:pic>
+                    <p:nvPicPr>
+                      <p:cNvPr id="0" name=""/>
+                      <p:cNvPicPr/>
+                      <p:nvPr/>
+                    </p:nvPicPr>
+                    <p:blipFill>
+                      <a:blip r:embed="rId4"/>
+                      <a:stretch>
+                        <a:fillRect/>
+                      </a:stretch>
+                    </p:blipFill>
+                    <p:spPr>
+                      <a:xfrm>
+                        <a:off x="3773488" y="2638425"/>
+                        <a:ext cx="4638675" cy="3735388"/>
+                      </a:xfrm>
+                      <a:prstGeom prst="rect">
+                        <a:avLst/>
+                      </a:prstGeom>
+                    </p:spPr>
+                  </p:pic>
+                </p:oleObj>
+              </mc:Fallback>
+            </mc:AlternateContent>
+          </a:graphicData>
+        </a:graphic>
+      </p:graphicFrame>
+    </p:spTree>
+    <p:extLst>
+      <p:ext uri="{BB962C8B-B14F-4D97-AF65-F5344CB8AC3E}">
+        <p14:creationId xmlns:p14="http://schemas.microsoft.com/office/powerpoint/2010/main" val="981965279"/>
+      </p:ext>
+    </p:extLst>
+  </p:cSld>
+  <p:clrMapOvr>
+    <a:masterClrMapping/>
+  </p:clrMapOvr>
+</p:sld>
+</file>
+
+<file path=ppt/slides/slide12.xml><?xml version="1.0" encoding="utf-8"?>
 <p:sld xmlns:a="http://schemas.openxmlformats.org/drawingml/2006/main" xmlns:r="http://schemas.openxmlformats.org/officeDocument/2006/relationships" xmlns:p="http://schemas.openxmlformats.org/presentationml/2006/main">
   <p:cSld>
     <p:spTree>
@@ -4564,7 +4692,7 @@
           <a:graphicData uri="http://schemas.openxmlformats.org/presentationml/2006/ole">
             <mc:AlternateContent xmlns:mc="http://schemas.openxmlformats.org/markup-compatibility/2006">
               <mc:Choice xmlns:v="urn:schemas-microsoft-com:vml" Requires="v">
-                <p:oleObj spid="_x0000_s3076" name="Document" r:id="rId4" imgW="8124840" imgH="6686640" progId="Word.OpenDocumentText.12">
+                <p:oleObj spid="_x0000_s3078" name="Document" r:id="rId4" imgW="8124840" imgH="6686640" progId="Word.OpenDocumentText.12">
                   <p:embed/>
                 </p:oleObj>
               </mc:Choice>
@@ -4804,7 +4932,7 @@
         </p:blipFill>
         <p:spPr>
           <a:xfrm>
-            <a:off x="5024288" y="497756"/>
+            <a:off x="4571283" y="497756"/>
             <a:ext cx="2143424" cy="2410161"/>
           </a:xfrm>
           <a:prstGeom prst="rect">
@@ -4828,25 +4956,25 @@
             <p:ph idx="1"/>
             <p:extLst>
               <p:ext uri="{D42A27DB-BD31-4B8C-83A1-F6EECF244321}">
-                <p14:modId xmlns:p14="http://schemas.microsoft.com/office/powerpoint/2010/main" val="525038444"/>
+                <p14:modId xmlns:p14="http://schemas.microsoft.com/office/powerpoint/2010/main" val="3616262201"/>
               </p:ext>
             </p:extLst>
           </p:nvPr>
         </p:nvGraphicFramePr>
         <p:xfrm>
-          <a:off x="2374900" y="3341201"/>
-          <a:ext cx="3721100" cy="3101975"/>
+          <a:off x="1058393" y="2221742"/>
+          <a:ext cx="3965895" cy="4011469"/>
         </p:xfrm>
         <a:graphic>
           <a:graphicData uri="http://schemas.openxmlformats.org/presentationml/2006/ole">
             <mc:AlternateContent xmlns:mc="http://schemas.openxmlformats.org/markup-compatibility/2006">
               <mc:Choice xmlns:v="urn:schemas-microsoft-com:vml" Requires="v">
-                <p:oleObj spid="_x0000_s2053" name="Document" r:id="rId4" imgW="8124840" imgH="6774120" progId="Word.OpenDocumentText.12">
+                <p:oleObj spid="_x0000_s2057" name="Document" r:id="rId4" imgW="8124840" imgH="8219160" progId="Word.OpenDocumentText.12">
                   <p:embed/>
                 </p:oleObj>
               </mc:Choice>
               <mc:Fallback>
-                <p:oleObj name="Document" r:id="rId4" imgW="8124840" imgH="6774120" progId="Word.OpenDocumentText.12">
+                <p:oleObj name="Document" r:id="rId4" imgW="8124840" imgH="8219160" progId="Word.OpenDocumentText.12">
                   <p:embed/>
                   <p:pic>
                     <p:nvPicPr>
@@ -4862,8 +4990,8 @@
                     </p:blipFill>
                     <p:spPr>
                       <a:xfrm>
-                        <a:off x="2374900" y="3341201"/>
-                        <a:ext cx="3721100" cy="3101975"/>
+                        <a:off x="1058393" y="2221742"/>
+                        <a:ext cx="3965895" cy="4011469"/>
                       </a:xfrm>
                       <a:prstGeom prst="rect">
                         <a:avLst/>
@@ -4891,20 +5019,20 @@
           <p:nvPr>
             <p:extLst>
               <p:ext uri="{D42A27DB-BD31-4B8C-83A1-F6EECF244321}">
-                <p14:modId xmlns:p14="http://schemas.microsoft.com/office/powerpoint/2010/main" val="3172601868"/>
+                <p14:modId xmlns:p14="http://schemas.microsoft.com/office/powerpoint/2010/main" val="1840606334"/>
               </p:ext>
             </p:extLst>
           </p:nvPr>
         </p:nvGraphicFramePr>
         <p:xfrm>
-          <a:off x="7167712" y="3341201"/>
+          <a:off x="7536828" y="2221742"/>
           <a:ext cx="4793311" cy="3259227"/>
         </p:xfrm>
         <a:graphic>
           <a:graphicData uri="http://schemas.openxmlformats.org/presentationml/2006/ole">
             <mc:AlternateContent xmlns:mc="http://schemas.openxmlformats.org/markup-compatibility/2006">
               <mc:Choice xmlns:v="urn:schemas-microsoft-com:vml" Requires="v">
-                <p:oleObj spid="_x0000_s2054" name="Document" r:id="rId6" imgW="8124840" imgH="5523840" progId="Word.OpenDocumentText.12">
+                <p:oleObj spid="_x0000_s2058" name="Document" r:id="rId6" imgW="8124840" imgH="5523840" progId="Word.OpenDocumentText.12">
                   <p:embed/>
                 </p:oleObj>
               </mc:Choice>
@@ -4925,7 +5053,7 @@
                     </p:blipFill>
                     <p:spPr>
                       <a:xfrm>
-                        <a:off x="7167712" y="3341201"/>
+                        <a:off x="7536828" y="2221742"/>
                         <a:ext cx="4793311" cy="3259227"/>
                       </a:xfrm>
                       <a:prstGeom prst="rect">
@@ -4939,6 +5067,84 @@
           </a:graphicData>
         </a:graphic>
       </p:graphicFrame>
+      <p:cxnSp>
+        <p:nvCxnSpPr>
+          <p:cNvPr id="3" name="Straight Arrow Connector 2">
+            <a:extLst>
+              <a:ext uri="{FF2B5EF4-FFF2-40B4-BE49-F238E27FC236}">
+                <a16:creationId xmlns:a16="http://schemas.microsoft.com/office/drawing/2014/main" id="{CF0924C2-163E-4118-B452-C6E28C3BF1EC}"/>
+              </a:ext>
+            </a:extLst>
+          </p:cNvPr>
+          <p:cNvCxnSpPr/>
+          <p:nvPr/>
+        </p:nvCxnSpPr>
+        <p:spPr>
+          <a:xfrm flipV="1">
+            <a:off x="3288484" y="2726422"/>
+            <a:ext cx="2197916" cy="906011"/>
+          </a:xfrm>
+          <a:prstGeom prst="straightConnector1">
+            <a:avLst/>
+          </a:prstGeom>
+          <a:ln>
+            <a:tailEnd type="triangle"/>
+          </a:ln>
+        </p:spPr>
+        <p:style>
+          <a:lnRef idx="1">
+            <a:schemeClr val="dk1"/>
+          </a:lnRef>
+          <a:fillRef idx="0">
+            <a:schemeClr val="dk1"/>
+          </a:fillRef>
+          <a:effectRef idx="0">
+            <a:schemeClr val="dk1"/>
+          </a:effectRef>
+          <a:fontRef idx="minor">
+            <a:schemeClr val="tx1"/>
+          </a:fontRef>
+        </p:style>
+      </p:cxnSp>
+      <p:cxnSp>
+        <p:nvCxnSpPr>
+          <p:cNvPr id="6" name="Straight Arrow Connector 5">
+            <a:extLst>
+              <a:ext uri="{FF2B5EF4-FFF2-40B4-BE49-F238E27FC236}">
+                <a16:creationId xmlns:a16="http://schemas.microsoft.com/office/drawing/2014/main" id="{02804013-405A-4406-9453-B81ED13EF996}"/>
+              </a:ext>
+            </a:extLst>
+          </p:cNvPr>
+          <p:cNvCxnSpPr/>
+          <p:nvPr/>
+        </p:nvCxnSpPr>
+        <p:spPr>
+          <a:xfrm flipH="1" flipV="1">
+            <a:off x="6627303" y="595618"/>
+            <a:ext cx="909525" cy="3137483"/>
+          </a:xfrm>
+          <a:prstGeom prst="straightConnector1">
+            <a:avLst/>
+          </a:prstGeom>
+          <a:ln>
+            <a:tailEnd type="triangle"/>
+          </a:ln>
+        </p:spPr>
+        <p:style>
+          <a:lnRef idx="1">
+            <a:schemeClr val="accent3"/>
+          </a:lnRef>
+          <a:fillRef idx="0">
+            <a:schemeClr val="accent3"/>
+          </a:fillRef>
+          <a:effectRef idx="0">
+            <a:schemeClr val="accent3"/>
+          </a:effectRef>
+          <a:fontRef idx="minor">
+            <a:schemeClr val="tx1"/>
+          </a:fontRef>
+        </p:style>
+      </p:cxnSp>
     </p:spTree>
     <p:extLst>
       <p:ext uri="{BB962C8B-B14F-4D97-AF65-F5344CB8AC3E}">

</xml_diff>